<commit_message>
Edited content of slides
</commit_message>
<xml_diff>
--- a/Demo/Demo4.pptx
+++ b/Demo/Demo4.pptx
@@ -3971,29 +3971,7 @@
                 <a:ea typeface="Arial Unicode MS" pitchFamily="34" charset="-128"/>
                 <a:cs typeface="Arial Unicode MS" pitchFamily="34" charset="-128"/>
               </a:rPr>
-              <a:t>~ </a:t>
-            </a:r>
-            <a:r>
-              <a:rPr lang="en-US" sz="3300" dirty="0" smtClean="0">
-                <a:ln>
-                  <a:solidFill>
-                    <a:schemeClr val="bg1">
-                      <a:lumMod val="75000"/>
-                      <a:lumOff val="25000"/>
-                    </a:schemeClr>
-                  </a:solidFill>
-                </a:ln>
-                <a:solidFill>
-                  <a:schemeClr val="bg1">
-                    <a:lumMod val="75000"/>
-                    <a:lumOff val="25000"/>
-                  </a:schemeClr>
-                </a:solidFill>
-                <a:latin typeface="Arial Unicode MS" pitchFamily="34" charset="-128"/>
-                <a:ea typeface="Arial Unicode MS" pitchFamily="34" charset="-128"/>
-                <a:cs typeface="Arial Unicode MS" pitchFamily="34" charset="-128"/>
-              </a:rPr>
-              <a:t>Dynamic Menu pages finished</a:t>
+              <a:t>~ Dynamic Menu pages finished</a:t>
             </a:r>
           </a:p>
           <a:p>
@@ -4459,7 +4437,7 @@
         <p:spPr>
           <a:xfrm>
             <a:off x="395536" y="1340768"/>
-            <a:ext cx="8496944" cy="3130744"/>
+            <a:ext cx="8496944" cy="4146407"/>
           </a:xfrm>
           <a:prstGeom prst="rect">
             <a:avLst/>
@@ -4516,6 +4494,71 @@
               </a:rPr>
               <a:t>problem</a:t>
             </a:r>
+          </a:p>
+          <a:p>
+            <a:r>
+              <a:rPr lang="en-US" sz="3300" dirty="0" smtClean="0">
+                <a:ln>
+                  <a:solidFill>
+                    <a:schemeClr val="bg1">
+                      <a:lumMod val="75000"/>
+                      <a:lumOff val="25000"/>
+                    </a:schemeClr>
+                  </a:solidFill>
+                </a:ln>
+                <a:solidFill>
+                  <a:schemeClr val="bg1">
+                    <a:lumMod val="75000"/>
+                    <a:lumOff val="25000"/>
+                  </a:schemeClr>
+                </a:solidFill>
+                <a:latin typeface="Arial Unicode MS" pitchFamily="34" charset="-128"/>
+                <a:ea typeface="Arial Unicode MS" pitchFamily="34" charset="-128"/>
+                <a:cs typeface="Arial Unicode MS" pitchFamily="34" charset="-128"/>
+              </a:rPr>
+              <a:t>~The maximum limit now displays on </a:t>
+            </a:r>
+            <a:r>
+              <a:rPr lang="en-US" sz="3300" smtClean="0">
+                <a:ln>
+                  <a:solidFill>
+                    <a:schemeClr val="bg1">
+                      <a:lumMod val="75000"/>
+                      <a:lumOff val="25000"/>
+                    </a:schemeClr>
+                  </a:solidFill>
+                </a:ln>
+                <a:solidFill>
+                  <a:schemeClr val="bg1">
+                    <a:lumMod val="75000"/>
+                    <a:lumOff val="25000"/>
+                  </a:schemeClr>
+                </a:solidFill>
+                <a:latin typeface="Arial Unicode MS" pitchFamily="34" charset="-128"/>
+                <a:ea typeface="Arial Unicode MS" pitchFamily="34" charset="-128"/>
+                <a:cs typeface="Arial Unicode MS" pitchFamily="34" charset="-128"/>
+              </a:rPr>
+              <a:t>the sign up page</a:t>
+            </a:r>
+            <a:endParaRPr lang="en-US" sz="3300" dirty="0" smtClean="0">
+              <a:ln>
+                <a:solidFill>
+                  <a:schemeClr val="bg1">
+                    <a:lumMod val="75000"/>
+                    <a:lumOff val="25000"/>
+                  </a:schemeClr>
+                </a:solidFill>
+              </a:ln>
+              <a:solidFill>
+                <a:schemeClr val="bg1">
+                  <a:lumMod val="75000"/>
+                  <a:lumOff val="25000"/>
+                </a:schemeClr>
+              </a:solidFill>
+              <a:latin typeface="Arial Unicode MS" pitchFamily="34" charset="-128"/>
+              <a:ea typeface="Arial Unicode MS" pitchFamily="34" charset="-128"/>
+              <a:cs typeface="Arial Unicode MS" pitchFamily="34" charset="-128"/>
+            </a:endParaRPr>
           </a:p>
           <a:p>
             <a:r>
@@ -4733,36 +4776,7 @@
                 <a:ea typeface="Arial Unicode MS" pitchFamily="34" charset="-128"/>
                 <a:cs typeface="Arial Unicode MS" pitchFamily="34" charset="-128"/>
               </a:rPr>
-              <a:t>Next </a:t>
-            </a:r>
-            <a:r>
-              <a:rPr lang="en-US" sz="5400" dirty="0" smtClean="0">
-                <a:ln>
-                  <a:solidFill>
-                    <a:schemeClr val="bg1">
-                      <a:lumMod val="75000"/>
-                      <a:lumOff val="25000"/>
-                    </a:schemeClr>
-                  </a:solidFill>
-                </a:ln>
-                <a:solidFill>
-                  <a:schemeClr val="bg1">
-                    <a:lumMod val="75000"/>
-                    <a:lumOff val="25000"/>
-                  </a:schemeClr>
-                </a:solidFill>
-                <a:effectLst>
-                  <a:outerShdw blurRad="38100" dist="38100" dir="2700000" algn="tl">
-                    <a:srgbClr val="000000">
-                      <a:alpha val="43137"/>
-                    </a:srgbClr>
-                  </a:outerShdw>
-                </a:effectLst>
-                <a:latin typeface="Arial Unicode MS" pitchFamily="34" charset="-128"/>
-                <a:ea typeface="Arial Unicode MS" pitchFamily="34" charset="-128"/>
-                <a:cs typeface="Arial Unicode MS" pitchFamily="34" charset="-128"/>
-              </a:rPr>
-              <a:t>Sprint</a:t>
+              <a:t>Next Sprint</a:t>
             </a:r>
             <a:endParaRPr lang="en-US" sz="5400" dirty="0">
               <a:ln>
@@ -4837,25 +4851,6 @@
               </a:rPr>
               <a:t>- Store history in history table</a:t>
             </a:r>
-            <a:endParaRPr lang="en-US" sz="3600" dirty="0" smtClean="0">
-              <a:ln>
-                <a:solidFill>
-                  <a:schemeClr val="bg1">
-                    <a:lumMod val="75000"/>
-                    <a:lumOff val="25000"/>
-                  </a:schemeClr>
-                </a:solidFill>
-              </a:ln>
-              <a:solidFill>
-                <a:schemeClr val="bg1">
-                  <a:lumMod val="75000"/>
-                  <a:lumOff val="25000"/>
-                </a:schemeClr>
-              </a:solidFill>
-              <a:latin typeface="Arial Unicode MS" pitchFamily="34" charset="-128"/>
-              <a:ea typeface="Arial Unicode MS" pitchFamily="34" charset="-128"/>
-              <a:cs typeface="Arial Unicode MS" pitchFamily="34" charset="-128"/>
-            </a:endParaRPr>
           </a:p>
           <a:p>
             <a:r>
@@ -5040,25 +5035,6 @@
               </a:rPr>
               <a:t> configuration i.e. themes</a:t>
             </a:r>
-            <a:endParaRPr lang="en-US" sz="3600" dirty="0" smtClean="0">
-              <a:ln>
-                <a:solidFill>
-                  <a:schemeClr val="bg1">
-                    <a:lumMod val="75000"/>
-                    <a:lumOff val="25000"/>
-                  </a:schemeClr>
-                </a:solidFill>
-              </a:ln>
-              <a:solidFill>
-                <a:schemeClr val="bg1">
-                  <a:lumMod val="75000"/>
-                  <a:lumOff val="25000"/>
-                </a:schemeClr>
-              </a:solidFill>
-              <a:latin typeface="Arial Unicode MS" pitchFamily="34" charset="-128"/>
-              <a:ea typeface="Arial Unicode MS" pitchFamily="34" charset="-128"/>
-              <a:cs typeface="Arial Unicode MS" pitchFamily="34" charset="-128"/>
-            </a:endParaRPr>
           </a:p>
         </p:txBody>
       </p:sp>
@@ -5237,49 +5213,8 @@
                 <a:ea typeface="Arial Unicode MS" pitchFamily="34" charset="-128"/>
                 <a:cs typeface="Arial Unicode MS" pitchFamily="34" charset="-128"/>
               </a:rPr>
-              <a:t>~ Phase 5 </a:t>
-            </a:r>
-            <a:r>
-              <a:rPr lang="en-US" sz="3600" dirty="0" smtClean="0">
-                <a:ln>
-                  <a:solidFill>
-                    <a:schemeClr val="bg1">
-                      <a:lumMod val="75000"/>
-                      <a:lumOff val="25000"/>
-                    </a:schemeClr>
-                  </a:solidFill>
-                </a:ln>
-                <a:solidFill>
-                  <a:schemeClr val="bg1">
-                    <a:lumMod val="75000"/>
-                    <a:lumOff val="25000"/>
-                  </a:schemeClr>
-                </a:solidFill>
-                <a:latin typeface="Arial Unicode MS" pitchFamily="34" charset="-128"/>
-                <a:ea typeface="Arial Unicode MS" pitchFamily="34" charset="-128"/>
-                <a:cs typeface="Arial Unicode MS" pitchFamily="34" charset="-128"/>
-              </a:rPr>
-              <a:t>– Algorithms</a:t>
-            </a:r>
-            <a:endParaRPr lang="en-US" sz="3600" dirty="0" smtClean="0">
-              <a:ln>
-                <a:solidFill>
-                  <a:schemeClr val="bg1">
-                    <a:lumMod val="75000"/>
-                    <a:lumOff val="25000"/>
-                  </a:schemeClr>
-                </a:solidFill>
-              </a:ln>
-              <a:solidFill>
-                <a:schemeClr val="bg1">
-                  <a:lumMod val="75000"/>
-                  <a:lumOff val="25000"/>
-                </a:schemeClr>
-              </a:solidFill>
-              <a:latin typeface="Arial Unicode MS" pitchFamily="34" charset="-128"/>
-              <a:ea typeface="Arial Unicode MS" pitchFamily="34" charset="-128"/>
-              <a:cs typeface="Arial Unicode MS" pitchFamily="34" charset="-128"/>
-            </a:endParaRPr>
+              <a:t>~ Phase 5 – Algorithms</a:t>
+            </a:r>
           </a:p>
         </p:txBody>
       </p:sp>
@@ -5325,49 +5260,8 @@
                 <a:ea typeface="Arial Unicode MS" pitchFamily="34" charset="-128"/>
                 <a:cs typeface="Arial Unicode MS" pitchFamily="34" charset="-128"/>
               </a:rPr>
-              <a:t>~ </a:t>
-            </a:r>
-            <a:r>
-              <a:rPr lang="en-US" sz="3600" dirty="0" smtClean="0">
-                <a:ln>
-                  <a:solidFill>
-                    <a:schemeClr val="bg1">
-                      <a:lumMod val="75000"/>
-                      <a:lumOff val="25000"/>
-                    </a:schemeClr>
-                  </a:solidFill>
-                </a:ln>
-                <a:solidFill>
-                  <a:schemeClr val="bg1">
-                    <a:lumMod val="75000"/>
-                    <a:lumOff val="25000"/>
-                  </a:schemeClr>
-                </a:solidFill>
-                <a:latin typeface="Arial Unicode MS" pitchFamily="34" charset="-128"/>
-                <a:ea typeface="Arial Unicode MS" pitchFamily="34" charset="-128"/>
-                <a:cs typeface="Arial Unicode MS" pitchFamily="34" charset="-128"/>
-              </a:rPr>
-              <a:t>Final Phase – Nice to haves </a:t>
-            </a:r>
-            <a:endParaRPr lang="en-US" sz="3600" dirty="0" smtClean="0">
-              <a:ln>
-                <a:solidFill>
-                  <a:schemeClr val="bg1">
-                    <a:lumMod val="75000"/>
-                    <a:lumOff val="25000"/>
-                  </a:schemeClr>
-                </a:solidFill>
-              </a:ln>
-              <a:solidFill>
-                <a:schemeClr val="bg1">
-                  <a:lumMod val="75000"/>
-                  <a:lumOff val="25000"/>
-                </a:schemeClr>
-              </a:solidFill>
-              <a:latin typeface="Arial Unicode MS" pitchFamily="34" charset="-128"/>
-              <a:ea typeface="Arial Unicode MS" pitchFamily="34" charset="-128"/>
-              <a:cs typeface="Arial Unicode MS" pitchFamily="34" charset="-128"/>
-            </a:endParaRPr>
+              <a:t>~ Final Phase – Nice to haves </a:t>
+            </a:r>
           </a:p>
           <a:p>
             <a:endParaRPr lang="en-US" sz="3600" dirty="0" smtClean="0">

</xml_diff>